<commit_message>
Re-uploaded Due To Technical Issues
</commit_message>
<xml_diff>
--- a/2025/Training Materials/HTML.pptx
+++ b/2025/Training Materials/HTML.pptx
@@ -40,7 +40,7 @@
   <p:notesSz cx="6858000" cy="9144000"/>
   <p:embeddedFontLst>
     <p:embeddedFont>
-      <p:font typeface="Dava Sans" pitchFamily="2" charset="0"/>
+      <p:font typeface="Dava Sans" panose="020B0604020202020204" charset="0"/>
       <p:regular r:id="rId30"/>
       <p:bold r:id="rId31"/>
       <p:italic r:id="rId32"/>
@@ -52,16 +52,16 @@
       <p:italic r:id="rId35"/>
     </p:embeddedFont>
     <p:embeddedFont>
-      <p:font typeface="MartianMono NF" panose="020B0009020000000004" pitchFamily="49" charset="0"/>
+      <p:font typeface="MartianMono NF" panose="020B0604020202020204" charset="0"/>
       <p:regular r:id="rId36"/>
       <p:bold r:id="rId37"/>
     </p:embeddedFont>
     <p:embeddedFont>
-      <p:font typeface="Poppins Regular" panose="00000500000000000000" charset="0"/>
+      <p:font typeface="Poppins Regular" panose="020B0604020202020204" charset="0"/>
       <p:regular r:id="rId38"/>
     </p:embeddedFont>
     <p:embeddedFont>
-      <p:font typeface="Poppins SemiBold" panose="00000700000000000000" pitchFamily="2" charset="0"/>
+      <p:font typeface="Poppins SemiBold" panose="020B0604020202020204" charset="0"/>
       <p:bold r:id="rId39"/>
       <p:boldItalic r:id="rId40"/>
     </p:embeddedFont>
@@ -432,6 +432,30 @@
 <file path=ppt/changesInfos/changesInfo1.xml><?xml version="1.0" encoding="utf-8"?>
 <pc:chgInfo xmlns:a="http://schemas.openxmlformats.org/drawingml/2006/main" xmlns:r="http://schemas.openxmlformats.org/officeDocument/2006/relationships" xmlns:ac="http://schemas.microsoft.com/office/drawing/2013/main/command" xmlns:pc="http://schemas.microsoft.com/office/powerpoint/2013/main/command">
   <pc:docChgLst>
+    <pc:chgData name="Bantwal Hebbahalasinakate, Mayur Pai" userId="754cdd8c-0ff8-48ba-be35-c2e80932eaf7" providerId="ADAL" clId="{69288EDD-EE3A-49B5-BC7B-07E719CBEE47}"/>
+    <pc:docChg chg="modSld">
+      <pc:chgData name="Bantwal Hebbahalasinakate, Mayur Pai" userId="754cdd8c-0ff8-48ba-be35-c2e80932eaf7" providerId="ADAL" clId="{69288EDD-EE3A-49B5-BC7B-07E719CBEE47}" dt="2025-09-01T07:20:35.836" v="3" actId="207"/>
+      <pc:docMkLst>
+        <pc:docMk/>
+      </pc:docMkLst>
+      <pc:sldChg chg="modSp mod">
+        <pc:chgData name="Bantwal Hebbahalasinakate, Mayur Pai" userId="754cdd8c-0ff8-48ba-be35-c2e80932eaf7" providerId="ADAL" clId="{69288EDD-EE3A-49B5-BC7B-07E719CBEE47}" dt="2025-09-01T07:20:35.836" v="3" actId="207"/>
+        <pc:sldMkLst>
+          <pc:docMk/>
+          <pc:sldMk cId="147234377" sldId="546"/>
+        </pc:sldMkLst>
+        <pc:spChg chg="mod">
+          <ac:chgData name="Bantwal Hebbahalasinakate, Mayur Pai" userId="754cdd8c-0ff8-48ba-be35-c2e80932eaf7" providerId="ADAL" clId="{69288EDD-EE3A-49B5-BC7B-07E719CBEE47}" dt="2025-09-01T07:20:35.836" v="3" actId="207"/>
+          <ac:spMkLst>
+            <pc:docMk/>
+            <pc:sldMk cId="147234377" sldId="546"/>
+            <ac:spMk id="8" creationId="{7B63759D-EABF-6E7E-5BE5-05AAF67B6A9B}"/>
+          </ac:spMkLst>
+        </pc:spChg>
+      </pc:sldChg>
+    </pc:docChg>
+  </pc:docChgLst>
+  <pc:docChgLst>
     <pc:chgData name="Boddepalli, Lavanya" userId="eaf4ee7c-b98b-41d0-a1e8-50a4f8a9dce3" providerId="ADAL" clId="{18BF8EDD-5EAE-40A0-AD20-7ADCA19C85DA}"/>
     <pc:docChg chg="undo custSel addSld modSld sldOrd modSection">
       <pc:chgData name="Boddepalli, Lavanya" userId="eaf4ee7c-b98b-41d0-a1e8-50a4f8a9dce3" providerId="ADAL" clId="{18BF8EDD-5EAE-40A0-AD20-7ADCA19C85DA}" dt="2025-08-19T04:55:43.935" v="4828" actId="20577"/>
@@ -729,6 +753,37 @@
             <ac:picMk id="3" creationId="{49E15347-4294-1A9F-8141-77D00DC9BFFC}"/>
           </ac:picMkLst>
         </pc:picChg>
+      </pc:sldChg>
+    </pc:docChg>
+  </pc:docChgLst>
+  <pc:docChgLst>
+    <pc:chgData name="Busanahalli Ravindra, Chandu" userId="S::cravindra@galaxe.com::204bb649-37ac-4aea-a87f-9cc4c7ec101b" providerId="AD" clId="Web-{1AD00DD1-F6D2-D466-1B1F-E23BCF46DBD1}"/>
+    <pc:docChg chg="modSld sldOrd">
+      <pc:chgData name="Busanahalli Ravindra, Chandu" userId="S::cravindra@galaxe.com::204bb649-37ac-4aea-a87f-9cc4c7ec101b" providerId="AD" clId="Web-{1AD00DD1-F6D2-D466-1B1F-E23BCF46DBD1}" dt="2025-09-01T05:56:11.743" v="2" actId="1076"/>
+      <pc:docMkLst>
+        <pc:docMk/>
+      </pc:docMkLst>
+      <pc:sldChg chg="modSp">
+        <pc:chgData name="Busanahalli Ravindra, Chandu" userId="S::cravindra@galaxe.com::204bb649-37ac-4aea-a87f-9cc4c7ec101b" providerId="AD" clId="Web-{1AD00DD1-F6D2-D466-1B1F-E23BCF46DBD1}" dt="2025-09-01T05:56:11.743" v="2" actId="1076"/>
+        <pc:sldMkLst>
+          <pc:docMk/>
+          <pc:sldMk cId="980947457" sldId="530"/>
+        </pc:sldMkLst>
+        <pc:grpChg chg="mod">
+          <ac:chgData name="Busanahalli Ravindra, Chandu" userId="S::cravindra@galaxe.com::204bb649-37ac-4aea-a87f-9cc4c7ec101b" providerId="AD" clId="Web-{1AD00DD1-F6D2-D466-1B1F-E23BCF46DBD1}" dt="2025-09-01T05:56:11.743" v="2" actId="1076"/>
+          <ac:grpSpMkLst>
+            <pc:docMk/>
+            <pc:sldMk cId="980947457" sldId="530"/>
+            <ac:grpSpMk id="11" creationId="{D9DEB5A7-D602-09B8-12AF-58E4EEBB3105}"/>
+          </ac:grpSpMkLst>
+        </pc:grpChg>
+      </pc:sldChg>
+      <pc:sldChg chg="ord">
+        <pc:chgData name="Busanahalli Ravindra, Chandu" userId="S::cravindra@galaxe.com::204bb649-37ac-4aea-a87f-9cc4c7ec101b" providerId="AD" clId="Web-{1AD00DD1-F6D2-D466-1B1F-E23BCF46DBD1}" dt="2025-09-01T05:41:44.875" v="0"/>
+        <pc:sldMkLst>
+          <pc:docMk/>
+          <pc:sldMk cId="678539276" sldId="535"/>
+        </pc:sldMkLst>
       </pc:sldChg>
     </pc:docChg>
   </pc:docChgLst>
@@ -1877,6 +1932,53 @@
     </pc:docChg>
   </pc:docChgLst>
   <pc:docChgLst>
+    <pc:chgData name="Boddepalli, Lavanya" userId="S::lboddepalli@galaxe.com::eaf4ee7c-b98b-41d0-a1e8-50a4f8a9dce3" providerId="AD" clId="Web-{F67A3FC5-2D32-4E7C-72F3-ED5287D4B67B}"/>
+    <pc:docChg chg="modSld">
+      <pc:chgData name="Boddepalli, Lavanya" userId="S::lboddepalli@galaxe.com::eaf4ee7c-b98b-41d0-a1e8-50a4f8a9dce3" providerId="AD" clId="Web-{F67A3FC5-2D32-4E7C-72F3-ED5287D4B67B}" dt="2025-09-01T06:58:44.477" v="42" actId="20577"/>
+      <pc:docMkLst>
+        <pc:docMk/>
+      </pc:docMkLst>
+      <pc:sldChg chg="modSp">
+        <pc:chgData name="Boddepalli, Lavanya" userId="S::lboddepalli@galaxe.com::eaf4ee7c-b98b-41d0-a1e8-50a4f8a9dce3" providerId="AD" clId="Web-{F67A3FC5-2D32-4E7C-72F3-ED5287D4B67B}" dt="2025-09-01T06:57:18.523" v="34" actId="20577"/>
+        <pc:sldMkLst>
+          <pc:docMk/>
+          <pc:sldMk cId="166880163" sldId="526"/>
+        </pc:sldMkLst>
+        <pc:spChg chg="mod">
+          <ac:chgData name="Boddepalli, Lavanya" userId="S::lboddepalli@galaxe.com::eaf4ee7c-b98b-41d0-a1e8-50a4f8a9dce3" providerId="AD" clId="Web-{F67A3FC5-2D32-4E7C-72F3-ED5287D4B67B}" dt="2025-09-01T06:57:18.523" v="34" actId="20577"/>
+          <ac:spMkLst>
+            <pc:docMk/>
+            <pc:sldMk cId="166880163" sldId="526"/>
+            <ac:spMk id="8" creationId="{8D73BA16-1EB3-583D-FE99-CD2FDC72461A}"/>
+          </ac:spMkLst>
+        </pc:spChg>
+        <pc:picChg chg="mod">
+          <ac:chgData name="Boddepalli, Lavanya" userId="S::lboddepalli@galaxe.com::eaf4ee7c-b98b-41d0-a1e8-50a4f8a9dce3" providerId="AD" clId="Web-{F67A3FC5-2D32-4E7C-72F3-ED5287D4B67B}" dt="2025-09-01T06:56:48.460" v="32" actId="1076"/>
+          <ac:picMkLst>
+            <pc:docMk/>
+            <pc:sldMk cId="166880163" sldId="526"/>
+            <ac:picMk id="5" creationId="{8F28A861-0135-388E-BE1B-A0804A69B884}"/>
+          </ac:picMkLst>
+        </pc:picChg>
+      </pc:sldChg>
+      <pc:sldChg chg="modSp">
+        <pc:chgData name="Boddepalli, Lavanya" userId="S::lboddepalli@galaxe.com::eaf4ee7c-b98b-41d0-a1e8-50a4f8a9dce3" providerId="AD" clId="Web-{F67A3FC5-2D32-4E7C-72F3-ED5287D4B67B}" dt="2025-09-01T06:58:44.477" v="42" actId="20577"/>
+        <pc:sldMkLst>
+          <pc:docMk/>
+          <pc:sldMk cId="221593116" sldId="527"/>
+        </pc:sldMkLst>
+        <pc:spChg chg="mod">
+          <ac:chgData name="Boddepalli, Lavanya" userId="S::lboddepalli@galaxe.com::eaf4ee7c-b98b-41d0-a1e8-50a4f8a9dce3" providerId="AD" clId="Web-{F67A3FC5-2D32-4E7C-72F3-ED5287D4B67B}" dt="2025-09-01T06:58:44.477" v="42" actId="20577"/>
+          <ac:spMkLst>
+            <pc:docMk/>
+            <pc:sldMk cId="221593116" sldId="527"/>
+            <ac:spMk id="8" creationId="{C0772E2D-70A2-A691-CF6E-F2347150B444}"/>
+          </ac:spMkLst>
+        </pc:spChg>
+      </pc:sldChg>
+    </pc:docChg>
+  </pc:docChgLst>
+  <pc:docChgLst>
     <pc:chgData name="Bantwal Hebbahalasinakate, Mayur Pai" userId="754cdd8c-0ff8-48ba-be35-c2e80932eaf7" providerId="ADAL" clId="{5703FC0A-0008-45B5-AEF5-C27D1505EEC7}"/>
     <pc:docChg chg="undo redo custSel addSld delSld modSld modSection">
       <pc:chgData name="Bantwal Hebbahalasinakate, Mayur Pai" userId="754cdd8c-0ff8-48ba-be35-c2e80932eaf7" providerId="ADAL" clId="{5703FC0A-0008-45B5-AEF5-C27D1505EEC7}" dt="2025-08-25T10:40:29.231" v="456" actId="20577"/>
@@ -2254,108 +2356,6 @@
             <ac:picMk id="3" creationId="{119D44B0-3D2B-C9F5-5731-C64F7ADEF51E}"/>
           </ac:picMkLst>
         </pc:picChg>
-      </pc:sldChg>
-    </pc:docChg>
-  </pc:docChgLst>
-  <pc:docChgLst>
-    <pc:chgData name="Bantwal Hebbahalasinakate, Mayur Pai" userId="754cdd8c-0ff8-48ba-be35-c2e80932eaf7" providerId="ADAL" clId="{69288EDD-EE3A-49B5-BC7B-07E719CBEE47}"/>
-    <pc:docChg chg="modSld">
-      <pc:chgData name="Bantwal Hebbahalasinakate, Mayur Pai" userId="754cdd8c-0ff8-48ba-be35-c2e80932eaf7" providerId="ADAL" clId="{69288EDD-EE3A-49B5-BC7B-07E719CBEE47}" dt="2025-09-01T07:20:35.836" v="3" actId="207"/>
-      <pc:docMkLst>
-        <pc:docMk/>
-      </pc:docMkLst>
-      <pc:sldChg chg="modSp mod">
-        <pc:chgData name="Bantwal Hebbahalasinakate, Mayur Pai" userId="754cdd8c-0ff8-48ba-be35-c2e80932eaf7" providerId="ADAL" clId="{69288EDD-EE3A-49B5-BC7B-07E719CBEE47}" dt="2025-09-01T07:20:35.836" v="3" actId="207"/>
-        <pc:sldMkLst>
-          <pc:docMk/>
-          <pc:sldMk cId="147234377" sldId="546"/>
-        </pc:sldMkLst>
-        <pc:spChg chg="mod">
-          <ac:chgData name="Bantwal Hebbahalasinakate, Mayur Pai" userId="754cdd8c-0ff8-48ba-be35-c2e80932eaf7" providerId="ADAL" clId="{69288EDD-EE3A-49B5-BC7B-07E719CBEE47}" dt="2025-09-01T07:20:35.836" v="3" actId="207"/>
-          <ac:spMkLst>
-            <pc:docMk/>
-            <pc:sldMk cId="147234377" sldId="546"/>
-            <ac:spMk id="8" creationId="{7B63759D-EABF-6E7E-5BE5-05AAF67B6A9B}"/>
-          </ac:spMkLst>
-        </pc:spChg>
-      </pc:sldChg>
-    </pc:docChg>
-  </pc:docChgLst>
-  <pc:docChgLst>
-    <pc:chgData name="Boddepalli, Lavanya" userId="S::lboddepalli@galaxe.com::eaf4ee7c-b98b-41d0-a1e8-50a4f8a9dce3" providerId="AD" clId="Web-{F67A3FC5-2D32-4E7C-72F3-ED5287D4B67B}"/>
-    <pc:docChg chg="modSld">
-      <pc:chgData name="Boddepalli, Lavanya" userId="S::lboddepalli@galaxe.com::eaf4ee7c-b98b-41d0-a1e8-50a4f8a9dce3" providerId="AD" clId="Web-{F67A3FC5-2D32-4E7C-72F3-ED5287D4B67B}" dt="2025-09-01T06:58:44.477" v="42" actId="20577"/>
-      <pc:docMkLst>
-        <pc:docMk/>
-      </pc:docMkLst>
-      <pc:sldChg chg="modSp">
-        <pc:chgData name="Boddepalli, Lavanya" userId="S::lboddepalli@galaxe.com::eaf4ee7c-b98b-41d0-a1e8-50a4f8a9dce3" providerId="AD" clId="Web-{F67A3FC5-2D32-4E7C-72F3-ED5287D4B67B}" dt="2025-09-01T06:57:18.523" v="34" actId="20577"/>
-        <pc:sldMkLst>
-          <pc:docMk/>
-          <pc:sldMk cId="166880163" sldId="526"/>
-        </pc:sldMkLst>
-        <pc:spChg chg="mod">
-          <ac:chgData name="Boddepalli, Lavanya" userId="S::lboddepalli@galaxe.com::eaf4ee7c-b98b-41d0-a1e8-50a4f8a9dce3" providerId="AD" clId="Web-{F67A3FC5-2D32-4E7C-72F3-ED5287D4B67B}" dt="2025-09-01T06:57:18.523" v="34" actId="20577"/>
-          <ac:spMkLst>
-            <pc:docMk/>
-            <pc:sldMk cId="166880163" sldId="526"/>
-            <ac:spMk id="8" creationId="{8D73BA16-1EB3-583D-FE99-CD2FDC72461A}"/>
-          </ac:spMkLst>
-        </pc:spChg>
-        <pc:picChg chg="mod">
-          <ac:chgData name="Boddepalli, Lavanya" userId="S::lboddepalli@galaxe.com::eaf4ee7c-b98b-41d0-a1e8-50a4f8a9dce3" providerId="AD" clId="Web-{F67A3FC5-2D32-4E7C-72F3-ED5287D4B67B}" dt="2025-09-01T06:56:48.460" v="32" actId="1076"/>
-          <ac:picMkLst>
-            <pc:docMk/>
-            <pc:sldMk cId="166880163" sldId="526"/>
-            <ac:picMk id="5" creationId="{8F28A861-0135-388E-BE1B-A0804A69B884}"/>
-          </ac:picMkLst>
-        </pc:picChg>
-      </pc:sldChg>
-      <pc:sldChg chg="modSp">
-        <pc:chgData name="Boddepalli, Lavanya" userId="S::lboddepalli@galaxe.com::eaf4ee7c-b98b-41d0-a1e8-50a4f8a9dce3" providerId="AD" clId="Web-{F67A3FC5-2D32-4E7C-72F3-ED5287D4B67B}" dt="2025-09-01T06:58:44.477" v="42" actId="20577"/>
-        <pc:sldMkLst>
-          <pc:docMk/>
-          <pc:sldMk cId="221593116" sldId="527"/>
-        </pc:sldMkLst>
-        <pc:spChg chg="mod">
-          <ac:chgData name="Boddepalli, Lavanya" userId="S::lboddepalli@galaxe.com::eaf4ee7c-b98b-41d0-a1e8-50a4f8a9dce3" providerId="AD" clId="Web-{F67A3FC5-2D32-4E7C-72F3-ED5287D4B67B}" dt="2025-09-01T06:58:44.477" v="42" actId="20577"/>
-          <ac:spMkLst>
-            <pc:docMk/>
-            <pc:sldMk cId="221593116" sldId="527"/>
-            <ac:spMk id="8" creationId="{C0772E2D-70A2-A691-CF6E-F2347150B444}"/>
-          </ac:spMkLst>
-        </pc:spChg>
-      </pc:sldChg>
-    </pc:docChg>
-  </pc:docChgLst>
-  <pc:docChgLst>
-    <pc:chgData name="Busanahalli Ravindra, Chandu" userId="S::cravindra@galaxe.com::204bb649-37ac-4aea-a87f-9cc4c7ec101b" providerId="AD" clId="Web-{1AD00DD1-F6D2-D466-1B1F-E23BCF46DBD1}"/>
-    <pc:docChg chg="modSld sldOrd">
-      <pc:chgData name="Busanahalli Ravindra, Chandu" userId="S::cravindra@galaxe.com::204bb649-37ac-4aea-a87f-9cc4c7ec101b" providerId="AD" clId="Web-{1AD00DD1-F6D2-D466-1B1F-E23BCF46DBD1}" dt="2025-09-01T05:56:11.743" v="2" actId="1076"/>
-      <pc:docMkLst>
-        <pc:docMk/>
-      </pc:docMkLst>
-      <pc:sldChg chg="modSp">
-        <pc:chgData name="Busanahalli Ravindra, Chandu" userId="S::cravindra@galaxe.com::204bb649-37ac-4aea-a87f-9cc4c7ec101b" providerId="AD" clId="Web-{1AD00DD1-F6D2-D466-1B1F-E23BCF46DBD1}" dt="2025-09-01T05:56:11.743" v="2" actId="1076"/>
-        <pc:sldMkLst>
-          <pc:docMk/>
-          <pc:sldMk cId="980947457" sldId="530"/>
-        </pc:sldMkLst>
-        <pc:grpChg chg="mod">
-          <ac:chgData name="Busanahalli Ravindra, Chandu" userId="S::cravindra@galaxe.com::204bb649-37ac-4aea-a87f-9cc4c7ec101b" providerId="AD" clId="Web-{1AD00DD1-F6D2-D466-1B1F-E23BCF46DBD1}" dt="2025-09-01T05:56:11.743" v="2" actId="1076"/>
-          <ac:grpSpMkLst>
-            <pc:docMk/>
-            <pc:sldMk cId="980947457" sldId="530"/>
-            <ac:grpSpMk id="11" creationId="{D9DEB5A7-D602-09B8-12AF-58E4EEBB3105}"/>
-          </ac:grpSpMkLst>
-        </pc:grpChg>
-      </pc:sldChg>
-      <pc:sldChg chg="ord">
-        <pc:chgData name="Busanahalli Ravindra, Chandu" userId="S::cravindra@galaxe.com::204bb649-37ac-4aea-a87f-9cc4c7ec101b" providerId="AD" clId="Web-{1AD00DD1-F6D2-D466-1B1F-E23BCF46DBD1}" dt="2025-09-01T05:41:44.875" v="0"/>
-        <pc:sldMkLst>
-          <pc:docMk/>
-          <pc:sldMk cId="678539276" sldId="535"/>
-        </pc:sldMkLst>
       </pc:sldChg>
     </pc:docChg>
   </pc:docChgLst>
@@ -3458,13 +3458,13 @@
   <p:clrMapOvr>
     <a:masterClrMapping/>
   </p:clrMapOvr>
-  <mc:AlternateContent xmlns:mc="http://schemas.openxmlformats.org/markup-compatibility/2006" xmlns:p159="http://schemas.microsoft.com/office/powerpoint/2015/09/main">
-    <mc:Choice Requires="p159">
+  <mc:AlternateContent xmlns:mc="http://schemas.openxmlformats.org/markup-compatibility/2006">
+    <mc:Choice xmlns:p159="http://schemas.microsoft.com/office/powerpoint/2015/09/main" Requires="p159">
       <p:transition>
         <p159:morph option="byChar"/>
       </p:transition>
     </mc:Choice>
-    <mc:Fallback xmlns="">
+    <mc:Fallback>
       <p:transition>
         <p:fade/>
       </p:transition>
@@ -3586,13 +3586,13 @@
   <p:clrMapOvr>
     <a:masterClrMapping/>
   </p:clrMapOvr>
-  <mc:AlternateContent xmlns:mc="http://schemas.openxmlformats.org/markup-compatibility/2006" xmlns:p159="http://schemas.microsoft.com/office/powerpoint/2015/09/main">
-    <mc:Choice Requires="p159">
+  <mc:AlternateContent xmlns:mc="http://schemas.openxmlformats.org/markup-compatibility/2006">
+    <mc:Choice xmlns:p159="http://schemas.microsoft.com/office/powerpoint/2015/09/main" Requires="p159">
       <p:transition>
         <p159:morph option="byChar"/>
       </p:transition>
     </mc:Choice>
-    <mc:Fallback xmlns="">
+    <mc:Fallback>
       <p:transition>
         <p:fade/>
       </p:transition>
@@ -3680,7 +3680,7 @@
           </a:ln>
           <a:extLst>
             <a:ext uri="{C572A759-6A51-4108-AA02-DFA0A04FC94B}">
-              <ma14:wrappingTextBoxFlag xmlns="" xmlns:ma14="http://schemas.microsoft.com/office/mac/drawingml/2011/main" xmlns:a14="http://schemas.microsoft.com/office/drawing/2010/main" xmlns:m="http://schemas.openxmlformats.org/officeDocument/2006/math" val="1"/>
+              <ma14:wrappingTextBoxFlag xmlns:m="http://schemas.openxmlformats.org/officeDocument/2006/math" xmlns:a14="http://schemas.microsoft.com/office/drawing/2010/main" xmlns:ma14="http://schemas.microsoft.com/office/mac/drawingml/2011/main" xmlns="" val="1"/>
             </a:ext>
           </a:extLst>
         </p:spPr>
@@ -3758,7 +3758,7 @@
           </a:ln>
           <a:extLst>
             <a:ext uri="{C572A759-6A51-4108-AA02-DFA0A04FC94B}">
-              <ma14:wrappingTextBoxFlag xmlns="" xmlns:ma14="http://schemas.microsoft.com/office/mac/drawingml/2011/main" xmlns:a14="http://schemas.microsoft.com/office/drawing/2010/main" xmlns:m="http://schemas.openxmlformats.org/officeDocument/2006/math" val="1"/>
+              <ma14:wrappingTextBoxFlag xmlns:m="http://schemas.openxmlformats.org/officeDocument/2006/math" xmlns:a14="http://schemas.microsoft.com/office/drawing/2010/main" xmlns:ma14="http://schemas.microsoft.com/office/mac/drawingml/2011/main" xmlns="" val="1"/>
             </a:ext>
           </a:extLst>
         </p:spPr>
@@ -4312,13 +4312,13 @@
   <p:clrMapOvr>
     <a:masterClrMapping/>
   </p:clrMapOvr>
-  <mc:AlternateContent xmlns:mc="http://schemas.openxmlformats.org/markup-compatibility/2006" xmlns:p159="http://schemas.microsoft.com/office/powerpoint/2015/09/main">
-    <mc:Choice Requires="p159">
+  <mc:AlternateContent xmlns:mc="http://schemas.openxmlformats.org/markup-compatibility/2006">
+    <mc:Choice xmlns:p159="http://schemas.microsoft.com/office/powerpoint/2015/09/main" Requires="p159">
       <p:transition>
         <p159:morph option="byChar"/>
       </p:transition>
     </mc:Choice>
-    <mc:Fallback xmlns="">
+    <mc:Fallback>
       <p:transition>
         <p:fade/>
       </p:transition>
@@ -4371,7 +4371,7 @@
           </a:ln>
           <a:extLst>
             <a:ext uri="{C572A759-6A51-4108-AA02-DFA0A04FC94B}">
-              <ma14:wrappingTextBoxFlag xmlns="" xmlns:m="http://schemas.openxmlformats.org/officeDocument/2006/math" xmlns:a14="http://schemas.microsoft.com/office/drawing/2010/main" xmlns:ma14="http://schemas.microsoft.com/office/mac/drawingml/2011/main" val="1"/>
+              <ma14:wrappingTextBoxFlag xmlns:ma14="http://schemas.microsoft.com/office/mac/drawingml/2011/main" xmlns:a14="http://schemas.microsoft.com/office/drawing/2010/main" xmlns:m="http://schemas.openxmlformats.org/officeDocument/2006/math" xmlns="" val="1"/>
             </a:ext>
           </a:extLst>
         </p:spPr>
@@ -4505,13 +4505,13 @@
   <p:clrMapOvr>
     <a:masterClrMapping/>
   </p:clrMapOvr>
-  <mc:AlternateContent xmlns:mc="http://schemas.openxmlformats.org/markup-compatibility/2006" xmlns:p159="http://schemas.microsoft.com/office/powerpoint/2015/09/main">
-    <mc:Choice Requires="p159">
+  <mc:AlternateContent xmlns:mc="http://schemas.openxmlformats.org/markup-compatibility/2006">
+    <mc:Choice xmlns:p159="http://schemas.microsoft.com/office/powerpoint/2015/09/main" Requires="p159">
       <p:transition>
         <p159:morph option="byChar"/>
       </p:transition>
     </mc:Choice>
-    <mc:Fallback xmlns="">
+    <mc:Fallback>
       <p:transition>
         <p:fade/>
       </p:transition>
@@ -5089,13 +5089,13 @@
   <p:clrMapOvr>
     <a:masterClrMapping/>
   </p:clrMapOvr>
-  <mc:AlternateContent xmlns:mc="http://schemas.openxmlformats.org/markup-compatibility/2006" xmlns:p159="http://schemas.microsoft.com/office/powerpoint/2015/09/main">
-    <mc:Choice Requires="p159">
+  <mc:AlternateContent xmlns:mc="http://schemas.openxmlformats.org/markup-compatibility/2006">
+    <mc:Choice xmlns:p159="http://schemas.microsoft.com/office/powerpoint/2015/09/main" Requires="p159">
       <p:transition>
         <p159:morph option="byChar"/>
       </p:transition>
     </mc:Choice>
-    <mc:Fallback xmlns="">
+    <mc:Fallback>
       <p:transition>
         <p:fade/>
       </p:transition>
@@ -5152,7 +5152,7 @@
           </a:ln>
           <a:extLst>
             <a:ext uri="{C572A759-6A51-4108-AA02-DFA0A04FC94B}">
-              <ma14:wrappingTextBoxFlag xmlns="" xmlns:ma14="http://schemas.microsoft.com/office/mac/drawingml/2011/main" xmlns:a14="http://schemas.microsoft.com/office/drawing/2010/main" xmlns:m="http://schemas.openxmlformats.org/officeDocument/2006/math" val="1"/>
+              <ma14:wrappingTextBoxFlag xmlns:m="http://schemas.openxmlformats.org/officeDocument/2006/math" xmlns:a14="http://schemas.microsoft.com/office/drawing/2010/main" xmlns:ma14="http://schemas.microsoft.com/office/mac/drawingml/2011/main" xmlns="" val="1"/>
             </a:ext>
           </a:extLst>
         </p:spPr>
@@ -5191,7 +5191,7 @@
           </a:ln>
           <a:extLst>
             <a:ext uri="{C572A759-6A51-4108-AA02-DFA0A04FC94B}">
-              <ma14:wrappingTextBoxFlag xmlns="" xmlns:ma14="http://schemas.microsoft.com/office/mac/drawingml/2011/main" xmlns:a14="http://schemas.microsoft.com/office/drawing/2010/main" xmlns:m="http://schemas.openxmlformats.org/officeDocument/2006/math" val="1"/>
+              <ma14:wrappingTextBoxFlag xmlns:m="http://schemas.openxmlformats.org/officeDocument/2006/math" xmlns:a14="http://schemas.microsoft.com/office/drawing/2010/main" xmlns:ma14="http://schemas.microsoft.com/office/mac/drawingml/2011/main" xmlns="" val="1"/>
             </a:ext>
           </a:extLst>
         </p:spPr>
@@ -15615,10 +15615,10 @@
           <a:lstStyle/>
           <a:p>
             <a:r>
-              <a:rPr lang="en-US" sz="8000" dirty="0"/>
+              <a:rPr lang="en-US" sz="8000"/>
               <a:t>Exercise</a:t>
             </a:r>
-            <a:endParaRPr sz="8000" dirty="0"/>
+            <a:endParaRPr sz="8000"/>
           </a:p>
         </p:txBody>
       </p:sp>
@@ -15795,7 +15795,7 @@
             <a:p>
               <a:pPr algn="just"/>
               <a:r>
-                <a:rPr lang="en-US" sz="4000" dirty="0">
+                <a:rPr lang="en-US" sz="4000">
                   <a:solidFill>
                     <a:srgbClr val="FF5640"/>
                   </a:solidFill>
@@ -15811,7 +15811,7 @@
                 <a:buChar char="•"/>
               </a:pPr>
               <a:r>
-                <a:rPr lang="en-US" sz="3600" dirty="0">
+                <a:rPr lang="en-US" sz="3600">
                   <a:solidFill>
                     <a:schemeClr val="bg2"/>
                   </a:solidFill>
@@ -15825,7 +15825,7 @@
                 </a:rPr>
                 <a:t>Personal Portfolio Exercise</a:t>
               </a:r>
-              <a:endParaRPr lang="en-US" sz="4000" dirty="0">
+              <a:endParaRPr lang="en-US" sz="4000">
                 <a:solidFill>
                   <a:schemeClr val="bg2"/>
                 </a:solidFill>
@@ -16327,7 +16327,7 @@
           </a:prstGeom>
           <a:extLst>
             <a:ext uri="{C572A759-6A51-4108-AA02-DFA0A04FC94B}">
-              <ma14:wrappingTextBoxFlag xmlns="" xmlns:m="http://schemas.openxmlformats.org/officeDocument/2006/math" xmlns:a14="http://schemas.microsoft.com/office/drawing/2010/main" xmlns:ma14="http://schemas.microsoft.com/office/mac/drawingml/2011/main" val="1"/>
+              <ma14:wrappingTextBoxFlag xmlns:ma14="http://schemas.microsoft.com/office/mac/drawingml/2011/main" xmlns:a14="http://schemas.microsoft.com/office/drawing/2010/main" xmlns:m="http://schemas.openxmlformats.org/officeDocument/2006/math" xmlns="" val="1"/>
             </a:ext>
           </a:extLst>
         </p:spPr>
@@ -16382,7 +16382,7 @@
             </a:ln>
             <a:extLst>
               <a:ext uri="{C572A759-6A51-4108-AA02-DFA0A04FC94B}">
-                <ma14:wrappingTextBoxFlag xmlns="" xmlns:m="http://schemas.openxmlformats.org/officeDocument/2006/math" xmlns:a14="http://schemas.microsoft.com/office/drawing/2010/main" xmlns:ma14="http://schemas.microsoft.com/office/mac/drawingml/2011/main" val="1"/>
+                <ma14:wrappingTextBoxFlag xmlns:ma14="http://schemas.microsoft.com/office/mac/drawingml/2011/main" xmlns:a14="http://schemas.microsoft.com/office/drawing/2010/main" xmlns:m="http://schemas.openxmlformats.org/officeDocument/2006/math" xmlns="" val="1"/>
               </a:ext>
             </a:extLst>
           </p:spPr>
@@ -16466,7 +16466,7 @@
             </a:ln>
             <a:extLst>
               <a:ext uri="{C572A759-6A51-4108-AA02-DFA0A04FC94B}">
-                <ma14:wrappingTextBoxFlag xmlns="" xmlns:ma14="http://schemas.microsoft.com/office/mac/drawingml/2011/main" xmlns:a14="http://schemas.microsoft.com/office/drawing/2010/main" xmlns:m="http://schemas.openxmlformats.org/officeDocument/2006/math" val="1"/>
+                <ma14:wrappingTextBoxFlag xmlns:m="http://schemas.openxmlformats.org/officeDocument/2006/math" xmlns:a14="http://schemas.microsoft.com/office/drawing/2010/main" xmlns:ma14="http://schemas.microsoft.com/office/mac/drawingml/2011/main" xmlns="" val="1"/>
               </a:ext>
             </a:extLst>
           </p:spPr>
@@ -16753,7 +16753,7 @@
           </a:prstGeom>
           <a:extLst>
             <a:ext uri="{C572A759-6A51-4108-AA02-DFA0A04FC94B}">
-              <ma14:wrappingTextBoxFlag xmlns="" xmlns:ma14="http://schemas.microsoft.com/office/mac/drawingml/2011/main" xmlns:a14="http://schemas.microsoft.com/office/drawing/2010/main" xmlns:m="http://schemas.openxmlformats.org/officeDocument/2006/math" val="1"/>
+              <ma14:wrappingTextBoxFlag xmlns:m="http://schemas.openxmlformats.org/officeDocument/2006/math" xmlns:a14="http://schemas.microsoft.com/office/drawing/2010/main" xmlns:ma14="http://schemas.microsoft.com/office/mac/drawingml/2011/main" xmlns="" val="1"/>
             </a:ext>
           </a:extLst>
         </p:spPr>
@@ -16814,7 +16814,7 @@
             </a:ln>
             <a:extLst>
               <a:ext uri="{C572A759-6A51-4108-AA02-DFA0A04FC94B}">
-                <ma14:wrappingTextBoxFlag xmlns="" xmlns:ma14="http://schemas.microsoft.com/office/mac/drawingml/2011/main" xmlns:a14="http://schemas.microsoft.com/office/drawing/2010/main" xmlns:m="http://schemas.openxmlformats.org/officeDocument/2006/math" val="1"/>
+                <ma14:wrappingTextBoxFlag xmlns:m="http://schemas.openxmlformats.org/officeDocument/2006/math" xmlns:a14="http://schemas.microsoft.com/office/drawing/2010/main" xmlns:ma14="http://schemas.microsoft.com/office/mac/drawingml/2011/main" xmlns="" val="1"/>
               </a:ext>
             </a:extLst>
           </p:spPr>
@@ -17003,7 +17003,7 @@
               </a:ln>
               <a:extLst>
                 <a:ext uri="{C572A759-6A51-4108-AA02-DFA0A04FC94B}">
-                  <ma14:wrappingTextBoxFlag xmlns="" xmlns:m="http://schemas.openxmlformats.org/officeDocument/2006/math" xmlns:a14="http://schemas.microsoft.com/office/drawing/2010/main" xmlns:ma14="http://schemas.microsoft.com/office/mac/drawingml/2011/main" val="1"/>
+                  <ma14:wrappingTextBoxFlag xmlns:ma14="http://schemas.microsoft.com/office/mac/drawingml/2011/main" xmlns:a14="http://schemas.microsoft.com/office/drawing/2010/main" xmlns:m="http://schemas.openxmlformats.org/officeDocument/2006/math" xmlns="" val="1"/>
                 </a:ext>
               </a:extLst>
             </p:spPr>
@@ -17080,7 +17080,7 @@
               </a:ln>
               <a:extLst>
                 <a:ext uri="{C572A759-6A51-4108-AA02-DFA0A04FC94B}">
-                  <ma14:wrappingTextBoxFlag xmlns="" xmlns:m="http://schemas.openxmlformats.org/officeDocument/2006/math" xmlns:a14="http://schemas.microsoft.com/office/drawing/2010/main" xmlns:ma14="http://schemas.microsoft.com/office/mac/drawingml/2011/main" val="1"/>
+                  <ma14:wrappingTextBoxFlag xmlns:ma14="http://schemas.microsoft.com/office/mac/drawingml/2011/main" xmlns:a14="http://schemas.microsoft.com/office/drawing/2010/main" xmlns:m="http://schemas.openxmlformats.org/officeDocument/2006/math" xmlns="" val="1"/>
                 </a:ext>
               </a:extLst>
             </p:spPr>
@@ -18436,7 +18436,7 @@
             <a:p>
               <a:pPr algn="just"/>
               <a:r>
-                <a:rPr lang="en-US" sz="4000" dirty="0">
+                <a:rPr lang="en-US" sz="4000">
                   <a:solidFill>
                     <a:schemeClr val="bg1"/>
                   </a:solidFill>
@@ -18452,7 +18452,7 @@
                 <a:buChar char="•"/>
               </a:pPr>
               <a:r>
-                <a:rPr lang="en-US" sz="4000" dirty="0">
+                <a:rPr lang="en-US" sz="4000">
                   <a:solidFill>
                     <a:schemeClr val="bg2"/>
                   </a:solidFill>
@@ -18468,7 +18468,7 @@
                 <a:buChar char="•"/>
               </a:pPr>
               <a:r>
-                <a:rPr lang="en-US" sz="4000" dirty="0">
+                <a:rPr lang="en-US" sz="4000">
                   <a:solidFill>
                     <a:schemeClr val="bg2"/>
                   </a:solidFill>
@@ -18484,7 +18484,7 @@
                 <a:buChar char="•"/>
               </a:pPr>
               <a:r>
-                <a:rPr lang="en-US" sz="4000" dirty="0">
+                <a:rPr lang="en-US" sz="4000">
                   <a:solidFill>
                     <a:schemeClr val="bg2"/>
                   </a:solidFill>
@@ -18500,7 +18500,7 @@
                 <a:buChar char="•"/>
               </a:pPr>
               <a:r>
-                <a:rPr lang="en-US" sz="4000" dirty="0">
+                <a:rPr lang="en-US" sz="4000">
                   <a:solidFill>
                     <a:schemeClr val="bg2"/>
                   </a:solidFill>
@@ -18513,7 +18513,7 @@
             <a:p>
               <a:pPr algn="just"/>
               <a:r>
-                <a:rPr lang="en-US" sz="4000" dirty="0">
+                <a:rPr lang="en-US" sz="4000">
                   <a:solidFill>
                     <a:schemeClr val="bg2"/>
                   </a:solidFill>
@@ -18526,7 +18526,7 @@
             <a:p>
               <a:pPr algn="just"/>
               <a:r>
-                <a:rPr lang="en-US" sz="4000" dirty="0">
+                <a:rPr lang="en-US" sz="4000">
                   <a:solidFill>
                     <a:schemeClr val="bg2"/>
                   </a:solidFill>
@@ -18539,7 +18539,7 @@
             <a:p>
               <a:pPr algn="just"/>
               <a:r>
-                <a:rPr lang="en-US" sz="4000" dirty="0">
+                <a:rPr lang="en-US" sz="4000">
                   <a:solidFill>
                     <a:schemeClr val="bg2"/>
                   </a:solidFill>
@@ -18552,7 +18552,7 @@
             <a:p>
               <a:pPr algn="just"/>
               <a:r>
-                <a:rPr lang="en-US" sz="4000" dirty="0">
+                <a:rPr lang="en-US" sz="4000">
                   <a:solidFill>
                     <a:schemeClr val="bg1"/>
                   </a:solidFill>
@@ -18565,7 +18565,7 @@
             <a:p>
               <a:pPr algn="just"/>
               <a:r>
-                <a:rPr lang="en-US" sz="4000" b="1" dirty="0">
+                <a:rPr lang="en-US" sz="4000" b="1">
                   <a:solidFill>
                     <a:schemeClr val="bg1"/>
                   </a:solidFill>
@@ -18573,7 +18573,7 @@
                 <a:t>“</a:t>
               </a:r>
               <a:r>
-                <a:rPr lang="en-US" sz="4000" dirty="0">
+                <a:rPr lang="en-US" sz="4000">
                   <a:solidFill>
                     <a:srgbClr val="FFFFFF"/>
                   </a:solidFill>
@@ -18581,14 +18581,14 @@
                 <a:t>DOM is like a family tree of HTML elements.</a:t>
               </a:r>
               <a:r>
-                <a:rPr lang="en-US" sz="4000" b="1" dirty="0">
+                <a:rPr lang="en-US" sz="4000" b="1">
                   <a:solidFill>
                     <a:schemeClr val="bg1"/>
                   </a:solidFill>
                 </a:rPr>
                 <a:t>”</a:t>
               </a:r>
-              <a:endParaRPr lang="en-US" sz="4000" b="1" dirty="0">
+              <a:endParaRPr lang="en-US" sz="4000" b="1">
                 <a:solidFill>
                   <a:schemeClr val="bg1"/>
                 </a:solidFill>
@@ -24177,15 +24177,6 @@
 </file>
 
 <file path=customXml/item1.xml><?xml version="1.0" encoding="utf-8"?>
-<?mso-contentType ?>
-<FormTemplates xmlns="http://schemas.microsoft.com/sharepoint/v3/contenttype/forms">
-  <Display>DocumentLibraryForm</Display>
-  <Edit>DocumentLibraryForm</Edit>
-  <New>DocumentLibraryForm</New>
-</FormTemplates>
-</file>
-
-<file path=customXml/item2.xml><?xml version="1.0" encoding="utf-8"?>
 <ct:contentTypeSchema xmlns:ct="http://schemas.microsoft.com/office/2006/metadata/contentType" xmlns:ma="http://schemas.microsoft.com/office/2006/metadata/properties/metaAttributes" ct:_="" ma:_="" ma:contentTypeName="Document" ma:contentTypeID="0x0101004480604E87DF5041BD15CB4F557B211A" ma:contentTypeVersion="14" ma:contentTypeDescription="Create a new document." ma:contentTypeScope="" ma:versionID="a88e8bb0e7879107f0c07aadaf23de07">
   <xsd:schema xmlns:xsd="http://www.w3.org/2001/XMLSchema" xmlns:xs="http://www.w3.org/2001/XMLSchema" xmlns:p="http://schemas.microsoft.com/office/2006/metadata/properties" xmlns:ns2="78d364d5-28b3-46f0-8b40-ad8c9edf605c" xmlns:ns3="108da2a4-3037-4d7a-bf12-b2714ae87fcf" targetNamespace="http://schemas.microsoft.com/office/2006/metadata/properties" ma:root="true" ma:fieldsID="3b8936104071a705397c97e62d45e3af" ns2:_="" ns3:_="">
     <xsd:import namespace="78d364d5-28b3-46f0-8b40-ad8c9edf605c"/>
@@ -24414,15 +24405,16 @@
 </ct:contentTypeSchema>
 </file>
 
-<file path=customXml/itemProps1.xml><?xml version="1.0" encoding="utf-8"?>
-<ds:datastoreItem xmlns:ds="http://schemas.openxmlformats.org/officeDocument/2006/customXml" ds:itemID="{154546E5-6158-445B-86FA-D0CB17A6BF05}">
-  <ds:schemaRefs>
-    <ds:schemaRef ds:uri="http://schemas.microsoft.com/sharepoint/v3/contenttype/forms"/>
-  </ds:schemaRefs>
-</ds:datastoreItem>
+<file path=customXml/item2.xml><?xml version="1.0" encoding="utf-8"?>
+<?mso-contentType ?>
+<FormTemplates xmlns="http://schemas.microsoft.com/sharepoint/v3/contenttype/forms">
+  <Display>DocumentLibraryForm</Display>
+  <Edit>DocumentLibraryForm</Edit>
+  <New>DocumentLibraryForm</New>
+</FormTemplates>
 </file>
 
-<file path=customXml/itemProps2.xml><?xml version="1.0" encoding="utf-8"?>
+<file path=customXml/itemProps1.xml><?xml version="1.0" encoding="utf-8"?>
 <ds:datastoreItem xmlns:ds="http://schemas.openxmlformats.org/officeDocument/2006/customXml" ds:itemID="{8AC872FA-4377-438C-B264-583FE67DC013}">
   <ds:schemaRefs>
     <ds:schemaRef ds:uri="108da2a4-3037-4d7a-bf12-b2714ae87fcf"/>
@@ -24439,4 +24431,12 @@
     <ds:schemaRef ds:uri="http://www.w3.org/2001/XMLSchema"/>
   </ds:schemaRefs>
 </ds:datastoreItem>
+</file>
+
+<file path=customXml/itemProps2.xml><?xml version="1.0" encoding="utf-8"?>
+<ds:datastoreItem xmlns:ds="http://schemas.openxmlformats.org/officeDocument/2006/customXml" ds:itemID="{154546E5-6158-445B-86FA-D0CB17A6BF05}">
+  <ds:schemaRefs>
+    <ds:schemaRef ds:uri="http://schemas.microsoft.com/sharepoint/v3/contenttype/forms"/>
+  </ds:schemaRefs>
+</ds:datastoreItem>
 </file>
</xml_diff>

<commit_message>
Dumping Everything As We Wrap Up The Frontend Training
</commit_message>
<xml_diff>
--- a/2025/Training Materials/HTML.pptx
+++ b/2025/Training Materials/HTML.pptx
@@ -40,30 +40,25 @@
   <p:notesSz cx="6858000" cy="9144000"/>
   <p:embeddedFontLst>
     <p:embeddedFont>
-      <p:font typeface="Dava Sans" panose="020B0604020202020204" charset="0"/>
+      <p:font typeface="Dava Sans" pitchFamily="2" charset="0"/>
       <p:regular r:id="rId30"/>
       <p:bold r:id="rId31"/>
       <p:italic r:id="rId32"/>
       <p:boldItalic r:id="rId33"/>
     </p:embeddedFont>
     <p:embeddedFont>
-      <p:font typeface="Dava Sans Med" panose="020B0604020202020204" charset="0"/>
+      <p:font typeface="MartianMono NF" panose="020B0009020000000004" pitchFamily="49" charset="0"/>
       <p:regular r:id="rId34"/>
-      <p:italic r:id="rId35"/>
-    </p:embeddedFont>
-    <p:embeddedFont>
-      <p:font typeface="MartianMono NF" panose="020B0604020202020204" charset="0"/>
-      <p:regular r:id="rId36"/>
-      <p:bold r:id="rId37"/>
+      <p:bold r:id="rId35"/>
     </p:embeddedFont>
     <p:embeddedFont>
       <p:font typeface="Poppins Regular" panose="020B0604020202020204" charset="0"/>
-      <p:regular r:id="rId38"/>
+      <p:regular r:id="rId36"/>
     </p:embeddedFont>
     <p:embeddedFont>
-      <p:font typeface="Poppins SemiBold" panose="020B0604020202020204" charset="0"/>
-      <p:bold r:id="rId39"/>
-      <p:boldItalic r:id="rId40"/>
+      <p:font typeface="Poppins SemiBold" panose="00000700000000000000" pitchFamily="2" charset="0"/>
+      <p:bold r:id="rId37"/>
+      <p:boldItalic r:id="rId38"/>
     </p:embeddedFont>
   </p:embeddedFontLst>
   <p:defaultTextStyle>
@@ -421,7 +416,7 @@
 <file path=ppt/revisionInfo.xml><?xml version="1.0" encoding="utf-8"?>
 <p1510:revInfo xmlns:a="http://schemas.openxmlformats.org/drawingml/2006/main" xmlns:r="http://schemas.openxmlformats.org/officeDocument/2006/relationships" xmlns:p1510="http://schemas.microsoft.com/office/powerpoint/2015/10/main">
   <p1510:revLst>
-    <p1510:client id="{1AD00DD1-F6D2-D466-1B1F-E23BCF46DBD1}" v="3" dt="2025-09-01T05:56:11.743"/>
+    <p1510:client id="{1AD00DD1-F6D2-D466-1B1F-E23BCF46DBD1}" v="5" dt="2025-09-01T12:39:48.206"/>
     <p1510:client id="{5703FC0A-0008-45B5-AEF5-C27D1505EEC7}" v="2" dt="2025-09-01T07:20:35.836"/>
     <p1510:client id="{BAC556A8-913D-4075-B0CE-F03A94A06F30}" v="8" dt="2025-09-01T06:00:33.465"/>
     <p1510:client id="{F67A3FC5-2D32-4E7C-72F3-ED5287D4B67B}" v="88" dt="2025-09-01T06:58:46.133"/>
@@ -452,6 +447,52 @@
             <ac:spMk id="8" creationId="{7B63759D-EABF-6E7E-5BE5-05AAF67B6A9B}"/>
           </ac:spMkLst>
         </pc:spChg>
+      </pc:sldChg>
+    </pc:docChg>
+  </pc:docChgLst>
+  <pc:docChgLst>
+    <pc:chgData name="Busanahalli Ravindra, Chandu" userId="S::cravindra@galaxe.com::204bb649-37ac-4aea-a87f-9cc4c7ec101b" providerId="AD" clId="Web-{1AD00DD1-F6D2-D466-1B1F-E23BCF46DBD1}"/>
+    <pc:docChg chg="modSld sldOrd">
+      <pc:chgData name="Busanahalli Ravindra, Chandu" userId="S::cravindra@galaxe.com::204bb649-37ac-4aea-a87f-9cc4c7ec101b" providerId="AD" clId="Web-{1AD00DD1-F6D2-D466-1B1F-E23BCF46DBD1}" dt="2025-09-01T12:39:48.206" v="4" actId="1076"/>
+      <pc:docMkLst>
+        <pc:docMk/>
+      </pc:docMkLst>
+      <pc:sldChg chg="modSp">
+        <pc:chgData name="Busanahalli Ravindra, Chandu" userId="S::cravindra@galaxe.com::204bb649-37ac-4aea-a87f-9cc4c7ec101b" providerId="AD" clId="Web-{1AD00DD1-F6D2-D466-1B1F-E23BCF46DBD1}" dt="2025-09-01T05:56:11.743" v="2" actId="1076"/>
+        <pc:sldMkLst>
+          <pc:docMk/>
+          <pc:sldMk cId="980947457" sldId="530"/>
+        </pc:sldMkLst>
+        <pc:grpChg chg="mod">
+          <ac:chgData name="Busanahalli Ravindra, Chandu" userId="S::cravindra@galaxe.com::204bb649-37ac-4aea-a87f-9cc4c7ec101b" providerId="AD" clId="Web-{1AD00DD1-F6D2-D466-1B1F-E23BCF46DBD1}" dt="2025-09-01T05:56:11.743" v="2" actId="1076"/>
+          <ac:grpSpMkLst>
+            <pc:docMk/>
+            <pc:sldMk cId="980947457" sldId="530"/>
+            <ac:grpSpMk id="11" creationId="{D9DEB5A7-D602-09B8-12AF-58E4EEBB3105}"/>
+          </ac:grpSpMkLst>
+        </pc:grpChg>
+      </pc:sldChg>
+      <pc:sldChg chg="ord">
+        <pc:chgData name="Busanahalli Ravindra, Chandu" userId="S::cravindra@galaxe.com::204bb649-37ac-4aea-a87f-9cc4c7ec101b" providerId="AD" clId="Web-{1AD00DD1-F6D2-D466-1B1F-E23BCF46DBD1}" dt="2025-09-01T05:41:44.875" v="0"/>
+        <pc:sldMkLst>
+          <pc:docMk/>
+          <pc:sldMk cId="678539276" sldId="535"/>
+        </pc:sldMkLst>
+      </pc:sldChg>
+      <pc:sldChg chg="modSp">
+        <pc:chgData name="Busanahalli Ravindra, Chandu" userId="S::cravindra@galaxe.com::204bb649-37ac-4aea-a87f-9cc4c7ec101b" providerId="AD" clId="Web-{1AD00DD1-F6D2-D466-1B1F-E23BCF46DBD1}" dt="2025-09-01T12:39:48.206" v="4" actId="1076"/>
+        <pc:sldMkLst>
+          <pc:docMk/>
+          <pc:sldMk cId="466813535" sldId="543"/>
+        </pc:sldMkLst>
+        <pc:grpChg chg="mod">
+          <ac:chgData name="Busanahalli Ravindra, Chandu" userId="S::cravindra@galaxe.com::204bb649-37ac-4aea-a87f-9cc4c7ec101b" providerId="AD" clId="Web-{1AD00DD1-F6D2-D466-1B1F-E23BCF46DBD1}" dt="2025-09-01T12:39:48.206" v="4" actId="1076"/>
+          <ac:grpSpMkLst>
+            <pc:docMk/>
+            <pc:sldMk cId="466813535" sldId="543"/>
+            <ac:grpSpMk id="11" creationId="{4AC213F8-23E0-1B58-589E-0FBDE92484FD}"/>
+          </ac:grpSpMkLst>
+        </pc:grpChg>
       </pc:sldChg>
     </pc:docChg>
   </pc:docChgLst>
@@ -753,37 +794,6 @@
             <ac:picMk id="3" creationId="{49E15347-4294-1A9F-8141-77D00DC9BFFC}"/>
           </ac:picMkLst>
         </pc:picChg>
-      </pc:sldChg>
-    </pc:docChg>
-  </pc:docChgLst>
-  <pc:docChgLst>
-    <pc:chgData name="Busanahalli Ravindra, Chandu" userId="S::cravindra@galaxe.com::204bb649-37ac-4aea-a87f-9cc4c7ec101b" providerId="AD" clId="Web-{1AD00DD1-F6D2-D466-1B1F-E23BCF46DBD1}"/>
-    <pc:docChg chg="modSld sldOrd">
-      <pc:chgData name="Busanahalli Ravindra, Chandu" userId="S::cravindra@galaxe.com::204bb649-37ac-4aea-a87f-9cc4c7ec101b" providerId="AD" clId="Web-{1AD00DD1-F6D2-D466-1B1F-E23BCF46DBD1}" dt="2025-09-01T05:56:11.743" v="2" actId="1076"/>
-      <pc:docMkLst>
-        <pc:docMk/>
-      </pc:docMkLst>
-      <pc:sldChg chg="modSp">
-        <pc:chgData name="Busanahalli Ravindra, Chandu" userId="S::cravindra@galaxe.com::204bb649-37ac-4aea-a87f-9cc4c7ec101b" providerId="AD" clId="Web-{1AD00DD1-F6D2-D466-1B1F-E23BCF46DBD1}" dt="2025-09-01T05:56:11.743" v="2" actId="1076"/>
-        <pc:sldMkLst>
-          <pc:docMk/>
-          <pc:sldMk cId="980947457" sldId="530"/>
-        </pc:sldMkLst>
-        <pc:grpChg chg="mod">
-          <ac:chgData name="Busanahalli Ravindra, Chandu" userId="S::cravindra@galaxe.com::204bb649-37ac-4aea-a87f-9cc4c7ec101b" providerId="AD" clId="Web-{1AD00DD1-F6D2-D466-1B1F-E23BCF46DBD1}" dt="2025-09-01T05:56:11.743" v="2" actId="1076"/>
-          <ac:grpSpMkLst>
-            <pc:docMk/>
-            <pc:sldMk cId="980947457" sldId="530"/>
-            <ac:grpSpMk id="11" creationId="{D9DEB5A7-D602-09B8-12AF-58E4EEBB3105}"/>
-          </ac:grpSpMkLst>
-        </pc:grpChg>
-      </pc:sldChg>
-      <pc:sldChg chg="ord">
-        <pc:chgData name="Busanahalli Ravindra, Chandu" userId="S::cravindra@galaxe.com::204bb649-37ac-4aea-a87f-9cc4c7ec101b" providerId="AD" clId="Web-{1AD00DD1-F6D2-D466-1B1F-E23BCF46DBD1}" dt="2025-09-01T05:41:44.875" v="0"/>
-        <pc:sldMkLst>
-          <pc:docMk/>
-          <pc:sldMk cId="678539276" sldId="535"/>
-        </pc:sldMkLst>
       </pc:sldChg>
     </pc:docChg>
   </pc:docChgLst>
@@ -2456,7 +2466,7 @@
           <a:p>
             <a:fld id="{0B2A5286-0306-B143-BA49-3E397476CCE1}" type="datetimeFigureOut">
               <a:rPr lang="en-RO" smtClean="0"/>
-              <a:t>09/01/2025</a:t>
+              <a:t>09/02/2025</a:t>
             </a:fld>
             <a:endParaRPr lang="en-RO"/>
           </a:p>
@@ -3680,7 +3690,7 @@
           </a:ln>
           <a:extLst>
             <a:ext uri="{C572A759-6A51-4108-AA02-DFA0A04FC94B}">
-              <ma14:wrappingTextBoxFlag xmlns:m="http://schemas.openxmlformats.org/officeDocument/2006/math" xmlns:a14="http://schemas.microsoft.com/office/drawing/2010/main" xmlns:ma14="http://schemas.microsoft.com/office/mac/drawingml/2011/main" xmlns="" val="1"/>
+              <ma14:wrappingTextBoxFlag xmlns:ma14="http://schemas.microsoft.com/office/mac/drawingml/2011/main" xmlns:a14="http://schemas.microsoft.com/office/drawing/2010/main" xmlns:m="http://schemas.openxmlformats.org/officeDocument/2006/math" xmlns="" val="1"/>
             </a:ext>
           </a:extLst>
         </p:spPr>
@@ -3758,7 +3768,7 @@
           </a:ln>
           <a:extLst>
             <a:ext uri="{C572A759-6A51-4108-AA02-DFA0A04FC94B}">
-              <ma14:wrappingTextBoxFlag xmlns:m="http://schemas.openxmlformats.org/officeDocument/2006/math" xmlns:a14="http://schemas.microsoft.com/office/drawing/2010/main" xmlns:ma14="http://schemas.microsoft.com/office/mac/drawingml/2011/main" xmlns="" val="1"/>
+              <ma14:wrappingTextBoxFlag xmlns:ma14="http://schemas.microsoft.com/office/mac/drawingml/2011/main" xmlns:a14="http://schemas.microsoft.com/office/drawing/2010/main" xmlns:m="http://schemas.openxmlformats.org/officeDocument/2006/math" xmlns="" val="1"/>
             </a:ext>
           </a:extLst>
         </p:spPr>
@@ -4371,7 +4381,7 @@
           </a:ln>
           <a:extLst>
             <a:ext uri="{C572A759-6A51-4108-AA02-DFA0A04FC94B}">
-              <ma14:wrappingTextBoxFlag xmlns:ma14="http://schemas.microsoft.com/office/mac/drawingml/2011/main" xmlns:a14="http://schemas.microsoft.com/office/drawing/2010/main" xmlns:m="http://schemas.openxmlformats.org/officeDocument/2006/math" xmlns="" val="1"/>
+              <ma14:wrappingTextBoxFlag xmlns:m="http://schemas.openxmlformats.org/officeDocument/2006/math" xmlns:a14="http://schemas.microsoft.com/office/drawing/2010/main" xmlns:ma14="http://schemas.microsoft.com/office/mac/drawingml/2011/main" xmlns="" val="1"/>
             </a:ext>
           </a:extLst>
         </p:spPr>
@@ -5020,7 +5030,7 @@
           <a:p>
             <a:fld id="{8E488443-9381-4175-872B-039B7D7F1909}" type="datetime4">
               <a:rPr lang="en-US" smtClean="0"/>
-              <a:t>September 1, 2025</a:t>
+              <a:t>September 2, 2025</a:t>
             </a:fld>
             <a:endParaRPr lang="en-US"/>
           </a:p>
@@ -5152,7 +5162,7 @@
           </a:ln>
           <a:extLst>
             <a:ext uri="{C572A759-6A51-4108-AA02-DFA0A04FC94B}">
-              <ma14:wrappingTextBoxFlag xmlns:m="http://schemas.openxmlformats.org/officeDocument/2006/math" xmlns:a14="http://schemas.microsoft.com/office/drawing/2010/main" xmlns:ma14="http://schemas.microsoft.com/office/mac/drawingml/2011/main" xmlns="" val="1"/>
+              <ma14:wrappingTextBoxFlag xmlns:ma14="http://schemas.microsoft.com/office/mac/drawingml/2011/main" xmlns:a14="http://schemas.microsoft.com/office/drawing/2010/main" xmlns:m="http://schemas.openxmlformats.org/officeDocument/2006/math" xmlns="" val="1"/>
             </a:ext>
           </a:extLst>
         </p:spPr>
@@ -5191,7 +5201,7 @@
           </a:ln>
           <a:extLst>
             <a:ext uri="{C572A759-6A51-4108-AA02-DFA0A04FC94B}">
-              <ma14:wrappingTextBoxFlag xmlns:m="http://schemas.openxmlformats.org/officeDocument/2006/math" xmlns:a14="http://schemas.microsoft.com/office/drawing/2010/main" xmlns:ma14="http://schemas.microsoft.com/office/mac/drawingml/2011/main" xmlns="" val="1"/>
+              <ma14:wrappingTextBoxFlag xmlns:ma14="http://schemas.microsoft.com/office/mac/drawingml/2011/main" xmlns:a14="http://schemas.microsoft.com/office/drawing/2010/main" xmlns:m="http://schemas.openxmlformats.org/officeDocument/2006/math" xmlns="" val="1"/>
             </a:ext>
           </a:extLst>
         </p:spPr>
@@ -16327,7 +16337,7 @@
           </a:prstGeom>
           <a:extLst>
             <a:ext uri="{C572A759-6A51-4108-AA02-DFA0A04FC94B}">
-              <ma14:wrappingTextBoxFlag xmlns:ma14="http://schemas.microsoft.com/office/mac/drawingml/2011/main" xmlns:a14="http://schemas.microsoft.com/office/drawing/2010/main" xmlns:m="http://schemas.openxmlformats.org/officeDocument/2006/math" xmlns="" val="1"/>
+              <ma14:wrappingTextBoxFlag xmlns:m="http://schemas.openxmlformats.org/officeDocument/2006/math" xmlns:a14="http://schemas.microsoft.com/office/drawing/2010/main" xmlns:ma14="http://schemas.microsoft.com/office/mac/drawingml/2011/main" xmlns="" val="1"/>
             </a:ext>
           </a:extLst>
         </p:spPr>
@@ -16382,7 +16392,7 @@
             </a:ln>
             <a:extLst>
               <a:ext uri="{C572A759-6A51-4108-AA02-DFA0A04FC94B}">
-                <ma14:wrappingTextBoxFlag xmlns:ma14="http://schemas.microsoft.com/office/mac/drawingml/2011/main" xmlns:a14="http://schemas.microsoft.com/office/drawing/2010/main" xmlns:m="http://schemas.openxmlformats.org/officeDocument/2006/math" xmlns="" val="1"/>
+                <ma14:wrappingTextBoxFlag xmlns:m="http://schemas.openxmlformats.org/officeDocument/2006/math" xmlns:a14="http://schemas.microsoft.com/office/drawing/2010/main" xmlns:ma14="http://schemas.microsoft.com/office/mac/drawingml/2011/main" xmlns="" val="1"/>
               </a:ext>
             </a:extLst>
           </p:spPr>
@@ -16466,7 +16476,7 @@
             </a:ln>
             <a:extLst>
               <a:ext uri="{C572A759-6A51-4108-AA02-DFA0A04FC94B}">
-                <ma14:wrappingTextBoxFlag xmlns:m="http://schemas.openxmlformats.org/officeDocument/2006/math" xmlns:a14="http://schemas.microsoft.com/office/drawing/2010/main" xmlns:ma14="http://schemas.microsoft.com/office/mac/drawingml/2011/main" xmlns="" val="1"/>
+                <ma14:wrappingTextBoxFlag xmlns:ma14="http://schemas.microsoft.com/office/mac/drawingml/2011/main" xmlns:a14="http://schemas.microsoft.com/office/drawing/2010/main" xmlns:m="http://schemas.openxmlformats.org/officeDocument/2006/math" xmlns="" val="1"/>
               </a:ext>
             </a:extLst>
           </p:spPr>
@@ -16753,7 +16763,7 @@
           </a:prstGeom>
           <a:extLst>
             <a:ext uri="{C572A759-6A51-4108-AA02-DFA0A04FC94B}">
-              <ma14:wrappingTextBoxFlag xmlns:m="http://schemas.openxmlformats.org/officeDocument/2006/math" xmlns:a14="http://schemas.microsoft.com/office/drawing/2010/main" xmlns:ma14="http://schemas.microsoft.com/office/mac/drawingml/2011/main" xmlns="" val="1"/>
+              <ma14:wrappingTextBoxFlag xmlns:ma14="http://schemas.microsoft.com/office/mac/drawingml/2011/main" xmlns:a14="http://schemas.microsoft.com/office/drawing/2010/main" xmlns:m="http://schemas.openxmlformats.org/officeDocument/2006/math" xmlns="" val="1"/>
             </a:ext>
           </a:extLst>
         </p:spPr>
@@ -16814,7 +16824,7 @@
             </a:ln>
             <a:extLst>
               <a:ext uri="{C572A759-6A51-4108-AA02-DFA0A04FC94B}">
-                <ma14:wrappingTextBoxFlag xmlns:m="http://schemas.openxmlformats.org/officeDocument/2006/math" xmlns:a14="http://schemas.microsoft.com/office/drawing/2010/main" xmlns:ma14="http://schemas.microsoft.com/office/mac/drawingml/2011/main" xmlns="" val="1"/>
+                <ma14:wrappingTextBoxFlag xmlns:ma14="http://schemas.microsoft.com/office/mac/drawingml/2011/main" xmlns:a14="http://schemas.microsoft.com/office/drawing/2010/main" xmlns:m="http://schemas.openxmlformats.org/officeDocument/2006/math" xmlns="" val="1"/>
               </a:ext>
             </a:extLst>
           </p:spPr>
@@ -17003,7 +17013,7 @@
               </a:ln>
               <a:extLst>
                 <a:ext uri="{C572A759-6A51-4108-AA02-DFA0A04FC94B}">
-                  <ma14:wrappingTextBoxFlag xmlns:ma14="http://schemas.microsoft.com/office/mac/drawingml/2011/main" xmlns:a14="http://schemas.microsoft.com/office/drawing/2010/main" xmlns:m="http://schemas.openxmlformats.org/officeDocument/2006/math" xmlns="" val="1"/>
+                  <ma14:wrappingTextBoxFlag xmlns:m="http://schemas.openxmlformats.org/officeDocument/2006/math" xmlns:a14="http://schemas.microsoft.com/office/drawing/2010/main" xmlns:ma14="http://schemas.microsoft.com/office/mac/drawingml/2011/main" xmlns="" val="1"/>
                 </a:ext>
               </a:extLst>
             </p:spPr>
@@ -17080,7 +17090,7 @@
               </a:ln>
               <a:extLst>
                 <a:ext uri="{C572A759-6A51-4108-AA02-DFA0A04FC94B}">
-                  <ma14:wrappingTextBoxFlag xmlns:ma14="http://schemas.microsoft.com/office/mac/drawingml/2011/main" xmlns:a14="http://schemas.microsoft.com/office/drawing/2010/main" xmlns:m="http://schemas.openxmlformats.org/officeDocument/2006/math" xmlns="" val="1"/>
+                  <ma14:wrappingTextBoxFlag xmlns:m="http://schemas.openxmlformats.org/officeDocument/2006/math" xmlns:a14="http://schemas.microsoft.com/office/drawing/2010/main" xmlns:ma14="http://schemas.microsoft.com/office/mac/drawingml/2011/main" xmlns="" val="1"/>
                 </a:ext>
               </a:extLst>
             </p:spPr>

</xml_diff>